<commit_message>
Add starter files for 3 of the assignments in Intermediate R
</commit_message>
<xml_diff>
--- a/IntermediateR/slides.pptx
+++ b/IntermediateR/slides.pptx
@@ -10346,11 +10346,7 @@
                       <a:pPr algn="ctr"/>
                       <a:r>
                         <a:rPr lang="en-US" dirty="0" smtClean="0"/>
-                        <a:t>Duration </a:t>
-                      </a:r>
-                      <a:r>
-                        <a:rPr lang="en-US" dirty="0" smtClean="0"/>
-                        <a:t>(min)</a:t>
+                        <a:t>Duration (min)</a:t>
                       </a:r>
                       <a:endParaRPr lang="en-US" dirty="0"/>
                     </a:p>
@@ -10489,31 +10485,7 @@
                           <a:ea typeface="+mn-ea"/>
                           <a:cs typeface="+mn-cs"/>
                         </a:rPr>
-                        <a:t>8*floor</a:t>
-                      </a:r>
-                      <a:r>
-                        <a:rPr lang="en-US" sz="1800" kern="1200" dirty="0" smtClean="0">
-                          <a:solidFill>
-                            <a:schemeClr val="dk1"/>
-                          </a:solidFill>
-                          <a:effectLst/>
-                          <a:latin typeface="+mn-lt"/>
-                          <a:ea typeface="+mn-ea"/>
-                          <a:cs typeface="+mn-cs"/>
-                        </a:rPr>
-                        <a:t>(min/30)</a:t>
-                      </a:r>
-                      <a:r>
-                        <a:rPr lang="en-US" sz="1800" kern="1200" dirty="0" smtClean="0">
-                          <a:solidFill>
-                            <a:schemeClr val="dk1"/>
-                          </a:solidFill>
-                          <a:effectLst/>
-                          <a:latin typeface="+mn-lt"/>
-                          <a:ea typeface="+mn-ea"/>
-                          <a:cs typeface="+mn-cs"/>
-                        </a:rPr>
-                        <a:t>-10</a:t>
+                        <a:t>8*floor(min/30)-10</a:t>
                       </a:r>
                     </a:p>
                   </a:txBody>
@@ -11069,14 +11041,14 @@
           <p:nvPr>
             <p:extLst>
               <p:ext uri="{D42A27DB-BD31-4B8C-83A1-F6EECF244321}">
-                <p14:modId xmlns:p14="http://schemas.microsoft.com/office/powerpoint/2010/main" val="140319984"/>
+                <p14:modId xmlns:p14="http://schemas.microsoft.com/office/powerpoint/2010/main" val="1111752663"/>
               </p:ext>
             </p:extLst>
           </p:nvPr>
         </p:nvGraphicFramePr>
         <p:xfrm>
-          <a:off x="930122" y="3072237"/>
-          <a:ext cx="2137036" cy="2595880"/>
+          <a:off x="457201" y="3072237"/>
+          <a:ext cx="3353116" cy="2595880"/>
         </p:xfrm>
         <a:graphic>
           <a:graphicData uri="http://schemas.openxmlformats.org/drawingml/2006/table">
@@ -11085,8 +11057,9 @@
                 <a:tableStyleId>{5C22544A-7EE6-4342-B048-85BDC9FD1C3A}</a:tableStyleId>
               </a:tblPr>
               <a:tblGrid>
-                <a:gridCol w="1031084"/>
-                <a:gridCol w="1105952"/>
+                <a:gridCol w="1091292"/>
+                <a:gridCol w="1091292"/>
+                <a:gridCol w="1170532"/>
               </a:tblGrid>
               <a:tr h="370840">
                 <a:tc>
@@ -11094,6 +11067,21 @@
                     <a:bodyPr/>
                     <a:lstStyle/>
                     <a:p>
+                      <a:pPr algn="r"/>
+                      <a:endParaRPr lang="en-US" dirty="0"/>
+                    </a:p>
+                  </a:txBody>
+                  <a:tcPr>
+                    <a:solidFill>
+                      <a:srgbClr val="FFFFFF"/>
+                    </a:solidFill>
+                  </a:tcPr>
+                </a:tc>
+                <a:tc>
+                  <a:txBody>
+                    <a:bodyPr/>
+                    <a:lstStyle/>
+                    <a:p>
                       <a:pPr algn="ctr"/>
                       <a:r>
                         <a:rPr lang="en-US" dirty="0" smtClean="0"/>
@@ -11121,6 +11109,23 @@
                 </a:tc>
               </a:tr>
               <a:tr h="370840">
+                <a:tc>
+                  <a:txBody>
+                    <a:bodyPr/>
+                    <a:lstStyle/>
+                    <a:p>
+                      <a:pPr algn="r"/>
+                      <a:r>
+                        <a:rPr lang="en-US" dirty="0" smtClean="0"/>
+                        <a:t>Person 1</a:t>
+                      </a:r>
+                      <a:endParaRPr lang="en-US" dirty="0"/>
+                    </a:p>
+                  </a:txBody>
+                  <a:tcPr>
+                    <a:noFill/>
+                  </a:tcPr>
+                </a:tc>
                 <a:tc>
                   <a:txBody>
                     <a:bodyPr/>
@@ -11166,6 +11171,23 @@
                     <a:bodyPr/>
                     <a:lstStyle/>
                     <a:p>
+                      <a:pPr algn="r"/>
+                      <a:r>
+                        <a:rPr lang="en-US" dirty="0" smtClean="0"/>
+                        <a:t>Person 2</a:t>
+                      </a:r>
+                      <a:endParaRPr lang="en-US" dirty="0"/>
+                    </a:p>
+                  </a:txBody>
+                  <a:tcPr>
+                    <a:noFill/>
+                  </a:tcPr>
+                </a:tc>
+                <a:tc>
+                  <a:txBody>
+                    <a:bodyPr/>
+                    <a:lstStyle/>
+                    <a:p>
                       <a:pPr algn="ctr"/>
                       <a:r>
                         <a:rPr lang="en-US" dirty="0" smtClean="0"/>
@@ -11206,6 +11228,23 @@
                     <a:bodyPr/>
                     <a:lstStyle/>
                     <a:p>
+                      <a:pPr algn="r"/>
+                      <a:r>
+                        <a:rPr lang="en-US" dirty="0" smtClean="0"/>
+                        <a:t>Person 3</a:t>
+                      </a:r>
+                      <a:endParaRPr lang="en-US" dirty="0"/>
+                    </a:p>
+                  </a:txBody>
+                  <a:tcPr>
+                    <a:noFill/>
+                  </a:tcPr>
+                </a:tc>
+                <a:tc>
+                  <a:txBody>
+                    <a:bodyPr/>
+                    <a:lstStyle/>
+                    <a:p>
                       <a:pPr algn="ctr"/>
                       <a:r>
                         <a:rPr lang="en-US" dirty="0" smtClean="0"/>
@@ -11246,6 +11285,23 @@
                     <a:bodyPr/>
                     <a:lstStyle/>
                     <a:p>
+                      <a:pPr algn="r"/>
+                      <a:r>
+                        <a:rPr lang="en-US" dirty="0" smtClean="0"/>
+                        <a:t>Person 4</a:t>
+                      </a:r>
+                      <a:endParaRPr lang="en-US" dirty="0"/>
+                    </a:p>
+                  </a:txBody>
+                  <a:tcPr>
+                    <a:noFill/>
+                  </a:tcPr>
+                </a:tc>
+                <a:tc>
+                  <a:txBody>
+                    <a:bodyPr/>
+                    <a:lstStyle/>
+                    <a:p>
                       <a:pPr algn="ctr"/>
                       <a:r>
                         <a:rPr lang="en-US" dirty="0" smtClean="0"/>
@@ -11286,6 +11342,23 @@
                     <a:bodyPr/>
                     <a:lstStyle/>
                     <a:p>
+                      <a:pPr algn="r"/>
+                      <a:r>
+                        <a:rPr lang="en-US" dirty="0" smtClean="0"/>
+                        <a:t>Person 5</a:t>
+                      </a:r>
+                      <a:endParaRPr lang="en-US" dirty="0"/>
+                    </a:p>
+                  </a:txBody>
+                  <a:tcPr>
+                    <a:noFill/>
+                  </a:tcPr>
+                </a:tc>
+                <a:tc>
+                  <a:txBody>
+                    <a:bodyPr/>
+                    <a:lstStyle/>
+                    <a:p>
                       <a:pPr algn="ctr"/>
                       <a:r>
                         <a:rPr lang="en-US" dirty="0" smtClean="0"/>
@@ -11321,6 +11394,23 @@
                 </a:tc>
               </a:tr>
               <a:tr h="370840">
+                <a:tc>
+                  <a:txBody>
+                    <a:bodyPr/>
+                    <a:lstStyle/>
+                    <a:p>
+                      <a:pPr algn="r"/>
+                      <a:r>
+                        <a:rPr lang="en-US" dirty="0" smtClean="0"/>
+                        <a:t>Person 6</a:t>
+                      </a:r>
+                      <a:endParaRPr lang="en-US" dirty="0"/>
+                    </a:p>
+                  </a:txBody>
+                  <a:tcPr>
+                    <a:noFill/>
+                  </a:tcPr>
+                </a:tc>
                 <a:tc>
                   <a:txBody>
                     <a:bodyPr/>
@@ -11373,13 +11463,13 @@
           <p:nvPr>
             <p:extLst>
               <p:ext uri="{D42A27DB-BD31-4B8C-83A1-F6EECF244321}">
-                <p14:modId xmlns:p14="http://schemas.microsoft.com/office/powerpoint/2010/main" val="910111493"/>
+                <p14:modId xmlns:p14="http://schemas.microsoft.com/office/powerpoint/2010/main" val="2535652404"/>
               </p:ext>
             </p:extLst>
           </p:nvPr>
         </p:nvGraphicFramePr>
         <p:xfrm>
-          <a:off x="4508517" y="5443193"/>
+          <a:off x="5251677" y="5443193"/>
           <a:ext cx="1105952" cy="1112520"/>
         </p:xfrm>
         <a:graphic>
@@ -11463,13 +11553,13 @@
           <p:nvPr>
             <p:extLst>
               <p:ext uri="{D42A27DB-BD31-4B8C-83A1-F6EECF244321}">
-                <p14:modId xmlns:p14="http://schemas.microsoft.com/office/powerpoint/2010/main" val="2988860287"/>
+                <p14:modId xmlns:p14="http://schemas.microsoft.com/office/powerpoint/2010/main" val="152549427"/>
               </p:ext>
             </p:extLst>
           </p:nvPr>
         </p:nvGraphicFramePr>
         <p:xfrm>
-          <a:off x="4508517" y="4165317"/>
+          <a:off x="5251677" y="4165317"/>
           <a:ext cx="1105952" cy="1112520"/>
         </p:xfrm>
         <a:graphic>
@@ -11553,13 +11643,13 @@
           <p:nvPr>
             <p:extLst>
               <p:ext uri="{D42A27DB-BD31-4B8C-83A1-F6EECF244321}">
-                <p14:modId xmlns:p14="http://schemas.microsoft.com/office/powerpoint/2010/main" val="4045372915"/>
+                <p14:modId xmlns:p14="http://schemas.microsoft.com/office/powerpoint/2010/main" val="2539123815"/>
               </p:ext>
             </p:extLst>
           </p:nvPr>
         </p:nvGraphicFramePr>
         <p:xfrm>
-          <a:off x="4508517" y="2815547"/>
+          <a:off x="5251677" y="2815547"/>
           <a:ext cx="1105952" cy="1112520"/>
         </p:xfrm>
         <a:graphic>
@@ -11643,13 +11733,13 @@
           <p:nvPr>
             <p:extLst>
               <p:ext uri="{D42A27DB-BD31-4B8C-83A1-F6EECF244321}">
-                <p14:modId xmlns:p14="http://schemas.microsoft.com/office/powerpoint/2010/main" val="2169405869"/>
+                <p14:modId xmlns:p14="http://schemas.microsoft.com/office/powerpoint/2010/main" val="777284029"/>
               </p:ext>
             </p:extLst>
           </p:nvPr>
         </p:nvGraphicFramePr>
         <p:xfrm>
-          <a:off x="7117268" y="3794477"/>
+          <a:off x="7860428" y="3794477"/>
           <a:ext cx="1105952" cy="1483360"/>
         </p:xfrm>
         <a:graphic>
@@ -11755,7 +11845,7 @@
         </p:nvCxnSpPr>
         <p:spPr>
           <a:xfrm flipV="1">
-            <a:off x="3067158" y="3371807"/>
+            <a:off x="3810318" y="3371807"/>
             <a:ext cx="1441359" cy="248866"/>
           </a:xfrm>
           <a:prstGeom prst="straightConnector1">
@@ -11788,7 +11878,7 @@
         </p:nvCxnSpPr>
         <p:spPr>
           <a:xfrm flipV="1">
-            <a:off x="3067158" y="3794477"/>
+            <a:off x="3810318" y="3794477"/>
             <a:ext cx="1441359" cy="1694314"/>
           </a:xfrm>
           <a:prstGeom prst="straightConnector1">
@@ -11823,7 +11913,7 @@
         </p:nvCxnSpPr>
         <p:spPr>
           <a:xfrm>
-            <a:off x="3067158" y="4025972"/>
+            <a:off x="3810318" y="4025972"/>
             <a:ext cx="1441359" cy="695605"/>
           </a:xfrm>
           <a:prstGeom prst="straightConnector1">
@@ -11856,7 +11946,7 @@
         </p:nvCxnSpPr>
         <p:spPr>
           <a:xfrm>
-            <a:off x="3067158" y="5120280"/>
+            <a:off x="3810318" y="5120280"/>
             <a:ext cx="1441359" cy="0"/>
           </a:xfrm>
           <a:prstGeom prst="straightConnector1">
@@ -11892,8 +11982,8 @@
         </p:nvCxnSpPr>
         <p:spPr>
           <a:xfrm>
-            <a:off x="3067158" y="4370177"/>
-            <a:ext cx="1441359" cy="1629276"/>
+            <a:off x="3810317" y="4370177"/>
+            <a:ext cx="1441360" cy="1629276"/>
           </a:xfrm>
           <a:prstGeom prst="straightConnector1">
             <a:avLst/>
@@ -11925,7 +12015,7 @@
         </p:nvCxnSpPr>
         <p:spPr>
           <a:xfrm>
-            <a:off x="3067158" y="4721577"/>
+            <a:off x="3810318" y="4721577"/>
             <a:ext cx="1441359" cy="1695660"/>
           </a:xfrm>
           <a:prstGeom prst="straightConnector1">
@@ -11958,7 +12048,7 @@
         </p:nvSpPr>
         <p:spPr>
           <a:xfrm>
-            <a:off x="5614469" y="2815547"/>
+            <a:off x="6357629" y="2815547"/>
             <a:ext cx="218381" cy="1112520"/>
           </a:xfrm>
           <a:prstGeom prst="rightBrace">
@@ -11996,7 +12086,7 @@
         </p:nvSpPr>
         <p:spPr>
           <a:xfrm>
-            <a:off x="5614469" y="4165317"/>
+            <a:off x="6357629" y="4165317"/>
             <a:ext cx="218381" cy="1112520"/>
           </a:xfrm>
           <a:prstGeom prst="rightBrace">
@@ -12034,7 +12124,7 @@
         </p:nvSpPr>
         <p:spPr>
           <a:xfrm>
-            <a:off x="5614469" y="5443193"/>
+            <a:off x="6357629" y="5443193"/>
             <a:ext cx="218381" cy="1112520"/>
           </a:xfrm>
           <a:prstGeom prst="rightBrace">
@@ -12074,7 +12164,7 @@
         </p:nvCxnSpPr>
         <p:spPr>
           <a:xfrm>
-            <a:off x="5832850" y="3371807"/>
+            <a:off x="6576010" y="3371807"/>
             <a:ext cx="1284418" cy="998370"/>
           </a:xfrm>
           <a:prstGeom prst="straightConnector1">
@@ -12109,7 +12199,7 @@
         </p:nvCxnSpPr>
         <p:spPr>
           <a:xfrm>
-            <a:off x="5832850" y="4721577"/>
+            <a:off x="6576010" y="4721577"/>
             <a:ext cx="1284418" cy="0"/>
           </a:xfrm>
           <a:prstGeom prst="straightConnector1">
@@ -12144,7 +12234,7 @@
         </p:nvCxnSpPr>
         <p:spPr>
           <a:xfrm flipV="1">
-            <a:off x="5832850" y="5120280"/>
+            <a:off x="6576010" y="5120280"/>
             <a:ext cx="1284418" cy="879173"/>
           </a:xfrm>
           <a:prstGeom prst="straightConnector1">
@@ -12398,14 +12488,14 @@
           <p:nvPr>
             <p:extLst>
               <p:ext uri="{D42A27DB-BD31-4B8C-83A1-F6EECF244321}">
-                <p14:modId xmlns:p14="http://schemas.microsoft.com/office/powerpoint/2010/main" val="2701466297"/>
+                <p14:modId xmlns:p14="http://schemas.microsoft.com/office/powerpoint/2010/main" val="3978550664"/>
               </p:ext>
             </p:extLst>
           </p:nvPr>
         </p:nvGraphicFramePr>
         <p:xfrm>
-          <a:off x="984170" y="2529873"/>
-          <a:ext cx="2137036" cy="4079240"/>
+          <a:off x="351303" y="2529873"/>
+          <a:ext cx="3783303" cy="4079240"/>
         </p:xfrm>
         <a:graphic>
           <a:graphicData uri="http://schemas.openxmlformats.org/drawingml/2006/table">
@@ -12414,8 +12504,9 @@
                 <a:tableStyleId>{5C22544A-7EE6-4342-B048-85BDC9FD1C3A}</a:tableStyleId>
               </a:tblPr>
               <a:tblGrid>
-                <a:gridCol w="1031084"/>
-                <a:gridCol w="1105952"/>
+                <a:gridCol w="932302"/>
+                <a:gridCol w="1530296"/>
+                <a:gridCol w="1320705"/>
               </a:tblGrid>
               <a:tr h="370840">
                 <a:tc>
@@ -12423,6 +12514,21 @@
                     <a:bodyPr/>
                     <a:lstStyle/>
                     <a:p>
+                      <a:pPr algn="r"/>
+                      <a:endParaRPr lang="en-US" dirty="0"/>
+                    </a:p>
+                  </a:txBody>
+                  <a:tcPr>
+                    <a:solidFill>
+                      <a:srgbClr val="FFFFFF"/>
+                    </a:solidFill>
+                  </a:tcPr>
+                </a:tc>
+                <a:tc>
+                  <a:txBody>
+                    <a:bodyPr/>
+                    <a:lstStyle/>
+                    <a:p>
                       <a:pPr algn="ctr"/>
                       <a:r>
                         <a:rPr lang="en-US" dirty="0" smtClean="0"/>
@@ -12450,6 +12556,25 @@
                 </a:tc>
               </a:tr>
               <a:tr h="370840">
+                <a:tc>
+                  <a:txBody>
+                    <a:bodyPr/>
+                    <a:lstStyle/>
+                    <a:p>
+                      <a:pPr algn="r"/>
+                      <a:r>
+                        <a:rPr lang="en-US" dirty="0" smtClean="0"/>
+                        <a:t>Trip 1</a:t>
+                      </a:r>
+                      <a:endParaRPr lang="en-US" dirty="0"/>
+                    </a:p>
+                  </a:txBody>
+                  <a:tcPr>
+                    <a:solidFill>
+                      <a:srgbClr val="FFFFFF"/>
+                    </a:solidFill>
+                  </a:tcPr>
+                </a:tc>
                 <a:tc>
                   <a:txBody>
                     <a:bodyPr/>
@@ -12495,6 +12620,25 @@
                     <a:bodyPr/>
                     <a:lstStyle/>
                     <a:p>
+                      <a:pPr algn="r"/>
+                      <a:r>
+                        <a:rPr lang="en-US" dirty="0" smtClean="0"/>
+                        <a:t>Trip 2</a:t>
+                      </a:r>
+                      <a:endParaRPr lang="en-US" dirty="0"/>
+                    </a:p>
+                  </a:txBody>
+                  <a:tcPr>
+                    <a:solidFill>
+                      <a:srgbClr val="FFFFFF"/>
+                    </a:solidFill>
+                  </a:tcPr>
+                </a:tc>
+                <a:tc>
+                  <a:txBody>
+                    <a:bodyPr/>
+                    <a:lstStyle/>
+                    <a:p>
                       <a:pPr algn="ctr"/>
                       <a:r>
                         <a:rPr lang="en-US" dirty="0" smtClean="0"/>
@@ -12535,6 +12679,25 @@
                     <a:bodyPr/>
                     <a:lstStyle/>
                     <a:p>
+                      <a:pPr algn="r"/>
+                      <a:r>
+                        <a:rPr lang="en-US" dirty="0" smtClean="0"/>
+                        <a:t>Trip 3</a:t>
+                      </a:r>
+                      <a:endParaRPr lang="en-US" dirty="0"/>
+                    </a:p>
+                  </a:txBody>
+                  <a:tcPr>
+                    <a:solidFill>
+                      <a:srgbClr val="FFFFFF"/>
+                    </a:solidFill>
+                  </a:tcPr>
+                </a:tc>
+                <a:tc>
+                  <a:txBody>
+                    <a:bodyPr/>
+                    <a:lstStyle/>
+                    <a:p>
                       <a:pPr algn="ctr"/>
                       <a:r>
                         <a:rPr lang="en-US" dirty="0" smtClean="0"/>
@@ -12575,6 +12738,25 @@
                     <a:bodyPr/>
                     <a:lstStyle/>
                     <a:p>
+                      <a:pPr algn="r"/>
+                      <a:r>
+                        <a:rPr lang="en-US" dirty="0" smtClean="0"/>
+                        <a:t>Trip 4</a:t>
+                      </a:r>
+                      <a:endParaRPr lang="en-US" dirty="0"/>
+                    </a:p>
+                  </a:txBody>
+                  <a:tcPr>
+                    <a:solidFill>
+                      <a:srgbClr val="FFFFFF"/>
+                    </a:solidFill>
+                  </a:tcPr>
+                </a:tc>
+                <a:tc>
+                  <a:txBody>
+                    <a:bodyPr/>
+                    <a:lstStyle/>
+                    <a:p>
                       <a:pPr algn="ctr"/>
                       <a:r>
                         <a:rPr lang="en-US" dirty="0" smtClean="0"/>
@@ -12615,6 +12797,29 @@
                     <a:bodyPr/>
                     <a:lstStyle/>
                     <a:p>
+                      <a:pPr algn="r"/>
+                      <a:r>
+                        <a:rPr lang="en-US" dirty="0" smtClean="0"/>
+                        <a:t>Trip</a:t>
+                      </a:r>
+                      <a:r>
+                        <a:rPr lang="en-US" baseline="0" dirty="0" smtClean="0"/>
+                        <a:t> 5</a:t>
+                      </a:r>
+                      <a:endParaRPr lang="en-US" dirty="0"/>
+                    </a:p>
+                  </a:txBody>
+                  <a:tcPr>
+                    <a:solidFill>
+                      <a:srgbClr val="FFFFFF"/>
+                    </a:solidFill>
+                  </a:tcPr>
+                </a:tc>
+                <a:tc>
+                  <a:txBody>
+                    <a:bodyPr/>
+                    <a:lstStyle/>
+                    <a:p>
                       <a:pPr algn="ctr"/>
                       <a:r>
                         <a:rPr lang="en-US" dirty="0" smtClean="0"/>
@@ -12655,6 +12860,29 @@
                     <a:bodyPr/>
                     <a:lstStyle/>
                     <a:p>
+                      <a:pPr algn="r"/>
+                      <a:r>
+                        <a:rPr lang="en-US" dirty="0" smtClean="0"/>
+                        <a:t>Trip</a:t>
+                      </a:r>
+                      <a:r>
+                        <a:rPr lang="en-US" baseline="0" dirty="0" smtClean="0"/>
+                        <a:t> 6</a:t>
+                      </a:r>
+                      <a:endParaRPr lang="en-US" dirty="0"/>
+                    </a:p>
+                  </a:txBody>
+                  <a:tcPr>
+                    <a:solidFill>
+                      <a:srgbClr val="FFFFFF"/>
+                    </a:solidFill>
+                  </a:tcPr>
+                </a:tc>
+                <a:tc>
+                  <a:txBody>
+                    <a:bodyPr/>
+                    <a:lstStyle/>
+                    <a:p>
                       <a:pPr algn="ctr"/>
                       <a:r>
                         <a:rPr lang="en-US" dirty="0" smtClean="0"/>
@@ -12695,6 +12923,25 @@
                     <a:bodyPr/>
                     <a:lstStyle/>
                     <a:p>
+                      <a:pPr algn="r"/>
+                      <a:r>
+                        <a:rPr lang="en-US" dirty="0" smtClean="0"/>
+                        <a:t>Trip 7</a:t>
+                      </a:r>
+                      <a:endParaRPr lang="en-US" dirty="0"/>
+                    </a:p>
+                  </a:txBody>
+                  <a:tcPr>
+                    <a:solidFill>
+                      <a:srgbClr val="FFFFFF"/>
+                    </a:solidFill>
+                  </a:tcPr>
+                </a:tc>
+                <a:tc>
+                  <a:txBody>
+                    <a:bodyPr/>
+                    <a:lstStyle/>
+                    <a:p>
                       <a:pPr algn="ctr"/>
                       <a:r>
                         <a:rPr lang="en-US" dirty="0" smtClean="0"/>
@@ -12735,6 +12982,25 @@
                     <a:bodyPr/>
                     <a:lstStyle/>
                     <a:p>
+                      <a:pPr algn="r"/>
+                      <a:r>
+                        <a:rPr lang="en-US" dirty="0" smtClean="0"/>
+                        <a:t>Trip 8</a:t>
+                      </a:r>
+                      <a:endParaRPr lang="en-US" dirty="0"/>
+                    </a:p>
+                  </a:txBody>
+                  <a:tcPr>
+                    <a:solidFill>
+                      <a:srgbClr val="FFFFFF"/>
+                    </a:solidFill>
+                  </a:tcPr>
+                </a:tc>
+                <a:tc>
+                  <a:txBody>
+                    <a:bodyPr/>
+                    <a:lstStyle/>
+                    <a:p>
                       <a:pPr algn="ctr"/>
                       <a:r>
                         <a:rPr lang="en-US" dirty="0" smtClean="0"/>
@@ -12775,6 +13041,25 @@
                     <a:bodyPr/>
                     <a:lstStyle/>
                     <a:p>
+                      <a:pPr algn="r"/>
+                      <a:r>
+                        <a:rPr lang="en-US" dirty="0" smtClean="0"/>
+                        <a:t>Trip 9</a:t>
+                      </a:r>
+                      <a:endParaRPr lang="en-US" dirty="0"/>
+                    </a:p>
+                  </a:txBody>
+                  <a:tcPr>
+                    <a:solidFill>
+                      <a:srgbClr val="FFFFFF"/>
+                    </a:solidFill>
+                  </a:tcPr>
+                </a:tc>
+                <a:tc>
+                  <a:txBody>
+                    <a:bodyPr/>
+                    <a:lstStyle/>
+                    <a:p>
                       <a:pPr algn="ctr"/>
                       <a:r>
                         <a:rPr lang="en-US" dirty="0" smtClean="0"/>
@@ -12810,6 +13095,25 @@
                 </a:tc>
               </a:tr>
               <a:tr h="370840">
+                <a:tc>
+                  <a:txBody>
+                    <a:bodyPr/>
+                    <a:lstStyle/>
+                    <a:p>
+                      <a:pPr algn="r"/>
+                      <a:r>
+                        <a:rPr lang="en-US" dirty="0" smtClean="0"/>
+                        <a:t>Trip 10</a:t>
+                      </a:r>
+                      <a:endParaRPr lang="en-US" dirty="0"/>
+                    </a:p>
+                  </a:txBody>
+                  <a:tcPr>
+                    <a:solidFill>
+                      <a:srgbClr val="FFFFFF"/>
+                    </a:solidFill>
+                  </a:tcPr>
+                </a:tc>
                 <a:tc>
                   <a:txBody>
                     <a:bodyPr/>
@@ -12862,13 +13166,13 @@
           <p:nvPr>
             <p:extLst>
               <p:ext uri="{D42A27DB-BD31-4B8C-83A1-F6EECF244321}">
-                <p14:modId xmlns:p14="http://schemas.microsoft.com/office/powerpoint/2010/main" val="1312910158"/>
+                <p14:modId xmlns:p14="http://schemas.microsoft.com/office/powerpoint/2010/main" val="4069756801"/>
               </p:ext>
             </p:extLst>
           </p:nvPr>
         </p:nvGraphicFramePr>
         <p:xfrm>
-          <a:off x="6887572" y="3794477"/>
+          <a:off x="7900972" y="3794477"/>
           <a:ext cx="1105952" cy="1112520"/>
         </p:xfrm>
         <a:graphic>
@@ -12964,13 +13268,13 @@
           <p:nvPr>
             <p:extLst>
               <p:ext uri="{D42A27DB-BD31-4B8C-83A1-F6EECF244321}">
-                <p14:modId xmlns:p14="http://schemas.microsoft.com/office/powerpoint/2010/main" val="4160523850"/>
+                <p14:modId xmlns:p14="http://schemas.microsoft.com/office/powerpoint/2010/main" val="603442580"/>
               </p:ext>
             </p:extLst>
           </p:nvPr>
         </p:nvGraphicFramePr>
         <p:xfrm>
-          <a:off x="4477716" y="4262120"/>
+          <a:off x="5491116" y="4262120"/>
           <a:ext cx="1105952" cy="2595880"/>
         </p:xfrm>
         <a:graphic>
@@ -13138,13 +13442,13 @@
           <p:nvPr>
             <p:extLst>
               <p:ext uri="{D42A27DB-BD31-4B8C-83A1-F6EECF244321}">
-                <p14:modId xmlns:p14="http://schemas.microsoft.com/office/powerpoint/2010/main" val="980819829"/>
+                <p14:modId xmlns:p14="http://schemas.microsoft.com/office/powerpoint/2010/main" val="1635928645"/>
               </p:ext>
             </p:extLst>
           </p:nvPr>
         </p:nvGraphicFramePr>
         <p:xfrm>
-          <a:off x="4477716" y="2268235"/>
+          <a:off x="5491116" y="2268235"/>
           <a:ext cx="1105952" cy="1854200"/>
         </p:xfrm>
         <a:graphic>
@@ -13269,7 +13573,7 @@
         </p:nvCxnSpPr>
         <p:spPr>
           <a:xfrm>
-            <a:off x="3121206" y="3066764"/>
+            <a:off x="4134606" y="3066764"/>
             <a:ext cx="1356510" cy="1729276"/>
           </a:xfrm>
           <a:prstGeom prst="straightConnector1">
@@ -13302,7 +13606,7 @@
         </p:nvCxnSpPr>
         <p:spPr>
           <a:xfrm flipV="1">
-            <a:off x="3121206" y="2837094"/>
+            <a:off x="4134606" y="2837094"/>
             <a:ext cx="1356510" cy="621460"/>
           </a:xfrm>
           <a:prstGeom prst="straightConnector1">
@@ -13337,7 +13641,7 @@
         </p:nvCxnSpPr>
         <p:spPr>
           <a:xfrm flipV="1">
-            <a:off x="3121206" y="3195335"/>
+            <a:off x="4134606" y="3195335"/>
             <a:ext cx="1356510" cy="599142"/>
           </a:xfrm>
           <a:prstGeom prst="straightConnector1">
@@ -13370,7 +13674,7 @@
         </p:nvCxnSpPr>
         <p:spPr>
           <a:xfrm flipV="1">
-            <a:off x="3121206" y="3566633"/>
+            <a:off x="4134606" y="3566633"/>
             <a:ext cx="1356510" cy="695488"/>
           </a:xfrm>
           <a:prstGeom prst="straightConnector1">
@@ -13403,7 +13707,7 @@
         </p:nvCxnSpPr>
         <p:spPr>
           <a:xfrm flipV="1">
-            <a:off x="3121206" y="3944912"/>
+            <a:off x="4134606" y="3944912"/>
             <a:ext cx="1356510" cy="1715768"/>
           </a:xfrm>
           <a:prstGeom prst="straightConnector1">
@@ -13436,7 +13740,7 @@
         </p:nvCxnSpPr>
         <p:spPr>
           <a:xfrm>
-            <a:off x="3121206" y="4566371"/>
+            <a:off x="4134606" y="4566371"/>
             <a:ext cx="1356510" cy="607949"/>
           </a:xfrm>
           <a:prstGeom prst="straightConnector1">
@@ -13471,7 +13775,7 @@
         </p:nvCxnSpPr>
         <p:spPr>
           <a:xfrm>
-            <a:off x="3121206" y="4906997"/>
+            <a:off x="4134606" y="4906997"/>
             <a:ext cx="1356510" cy="653063"/>
           </a:xfrm>
           <a:prstGeom prst="straightConnector1">
@@ -13504,7 +13808,7 @@
         </p:nvCxnSpPr>
         <p:spPr>
           <a:xfrm>
-            <a:off x="3121206" y="5295909"/>
+            <a:off x="4134606" y="5295909"/>
             <a:ext cx="1356510" cy="621459"/>
           </a:xfrm>
           <a:prstGeom prst="straightConnector1">
@@ -13537,7 +13841,7 @@
         </p:nvCxnSpPr>
         <p:spPr>
           <a:xfrm>
-            <a:off x="3121206" y="6126163"/>
+            <a:off x="4134606" y="6126163"/>
             <a:ext cx="1356510" cy="196504"/>
           </a:xfrm>
           <a:prstGeom prst="straightConnector1">
@@ -13570,7 +13874,7 @@
         </p:nvCxnSpPr>
         <p:spPr>
           <a:xfrm>
-            <a:off x="3121206" y="6446993"/>
+            <a:off x="4134606" y="6446993"/>
             <a:ext cx="1356510" cy="248887"/>
           </a:xfrm>
           <a:prstGeom prst="straightConnector1">
@@ -13603,7 +13907,7 @@
         </p:nvSpPr>
         <p:spPr>
           <a:xfrm>
-            <a:off x="5624203" y="2268235"/>
+            <a:off x="6637603" y="2268235"/>
             <a:ext cx="154595" cy="1854200"/>
           </a:xfrm>
           <a:prstGeom prst="rightBrace">
@@ -13641,7 +13945,7 @@
         </p:nvSpPr>
         <p:spPr>
           <a:xfrm>
-            <a:off x="5624203" y="4262121"/>
+            <a:off x="6643566" y="4262121"/>
             <a:ext cx="154595" cy="2595880"/>
           </a:xfrm>
           <a:prstGeom prst="rightBrace">
@@ -13682,7 +13986,7 @@
         </p:nvCxnSpPr>
         <p:spPr>
           <a:xfrm>
-            <a:off x="5778798" y="3195335"/>
+            <a:off x="6792198" y="3195335"/>
             <a:ext cx="1108774" cy="1155402"/>
           </a:xfrm>
           <a:prstGeom prst="straightConnector1">
@@ -13710,14 +14014,12 @@
       <p:cxnSp>
         <p:nvCxnSpPr>
           <p:cNvPr id="52" name="Straight Arrow Connector 51"/>
-          <p:cNvCxnSpPr>
-            <a:stCxn id="48" idx="1"/>
-          </p:cNvCxnSpPr>
+          <p:cNvCxnSpPr/>
           <p:nvPr/>
         </p:nvCxnSpPr>
         <p:spPr>
           <a:xfrm flipV="1">
-            <a:off x="5778798" y="4796040"/>
+            <a:off x="6792198" y="4796040"/>
             <a:ext cx="1108774" cy="764021"/>
           </a:xfrm>
           <a:prstGeom prst="straightConnector1">
@@ -13825,7 +14127,15 @@
             </a:r>
             <a:r>
               <a:rPr lang="en-US" dirty="0" smtClean="0"/>
-              <a:t> charges a fee for any trip longer than 30 minutes. Use </a:t>
+              <a:t> charges a fee for any trip </a:t>
+            </a:r>
+            <a:r>
+              <a:rPr lang="en-US" dirty="0" smtClean="0"/>
+              <a:t>at least 30 minutes long. </a:t>
+            </a:r>
+            <a:r>
+              <a:rPr lang="en-US" dirty="0" smtClean="0"/>
+              <a:t>Use </a:t>
             </a:r>
             <a:r>
               <a:rPr lang="en-US" dirty="0" err="1" smtClean="0"/>
@@ -13833,8 +14143,13 @@
             </a:r>
             <a:r>
               <a:rPr lang="en-US" dirty="0" smtClean="0"/>
-              <a:t>() to compute the proportion of trips from each start location longer than 30 minutes (1800 seconds).</a:t>
-            </a:r>
+              <a:t>() to compute the proportion of trips from each start location </a:t>
+            </a:r>
+            <a:r>
+              <a:rPr lang="en-US" dirty="0" smtClean="0"/>
+              <a:t>at least 30 minutes long. (assignment2_start.R)</a:t>
+            </a:r>
+            <a:endParaRPr lang="en-US" dirty="0" smtClean="0"/>
           </a:p>
           <a:p>
             <a:r>

</xml_diff>